<commit_message>
Added SOA for CRM
</commit_message>
<xml_diff>
--- a/src/ServiceOrientedArchitecture/SOA.pptx
+++ b/src/ServiceOrientedArchitecture/SOA.pptx
@@ -8,6 +8,7 @@
     <p:sldId id="256" r:id="rId2"/>
     <p:sldId id="257" r:id="rId3"/>
     <p:sldId id="258" r:id="rId4"/>
+    <p:sldId id="259" r:id="rId5"/>
   </p:sldIdLst>
   <p:sldSz cx="9144000" cy="6858000" type="screen4x3"/>
   <p:notesSz cx="6858000" cy="9144000"/>
@@ -306,7 +307,7 @@
           <a:p>
             <a:fld id="{EF0E5ADF-327A-46A2-8071-02D8FFF28639}" type="datetimeFigureOut">
               <a:rPr lang="en-US" smtClean="0"/>
-              <a:t>5/17/2017</a:t>
+              <a:t>5/19/2017</a:t>
             </a:fld>
             <a:endParaRPr lang="en-US"/>
           </a:p>
@@ -476,7 +477,7 @@
           <a:p>
             <a:fld id="{EF0E5ADF-327A-46A2-8071-02D8FFF28639}" type="datetimeFigureOut">
               <a:rPr lang="en-US" smtClean="0"/>
-              <a:t>5/17/2017</a:t>
+              <a:t>5/19/2017</a:t>
             </a:fld>
             <a:endParaRPr lang="en-US"/>
           </a:p>
@@ -656,7 +657,7 @@
           <a:p>
             <a:fld id="{EF0E5ADF-327A-46A2-8071-02D8FFF28639}" type="datetimeFigureOut">
               <a:rPr lang="en-US" smtClean="0"/>
-              <a:t>5/17/2017</a:t>
+              <a:t>5/19/2017</a:t>
             </a:fld>
             <a:endParaRPr lang="en-US"/>
           </a:p>
@@ -826,7 +827,7 @@
           <a:p>
             <a:fld id="{EF0E5ADF-327A-46A2-8071-02D8FFF28639}" type="datetimeFigureOut">
               <a:rPr lang="en-US" smtClean="0"/>
-              <a:t>5/17/2017</a:t>
+              <a:t>5/19/2017</a:t>
             </a:fld>
             <a:endParaRPr lang="en-US"/>
           </a:p>
@@ -1072,7 +1073,7 @@
           <a:p>
             <a:fld id="{EF0E5ADF-327A-46A2-8071-02D8FFF28639}" type="datetimeFigureOut">
               <a:rPr lang="en-US" smtClean="0"/>
-              <a:t>5/17/2017</a:t>
+              <a:t>5/19/2017</a:t>
             </a:fld>
             <a:endParaRPr lang="en-US"/>
           </a:p>
@@ -1360,7 +1361,7 @@
           <a:p>
             <a:fld id="{EF0E5ADF-327A-46A2-8071-02D8FFF28639}" type="datetimeFigureOut">
               <a:rPr lang="en-US" smtClean="0"/>
-              <a:t>5/17/2017</a:t>
+              <a:t>5/19/2017</a:t>
             </a:fld>
             <a:endParaRPr lang="en-US"/>
           </a:p>
@@ -1782,7 +1783,7 @@
           <a:p>
             <a:fld id="{EF0E5ADF-327A-46A2-8071-02D8FFF28639}" type="datetimeFigureOut">
               <a:rPr lang="en-US" smtClean="0"/>
-              <a:t>5/17/2017</a:t>
+              <a:t>5/19/2017</a:t>
             </a:fld>
             <a:endParaRPr lang="en-US"/>
           </a:p>
@@ -1900,7 +1901,7 @@
           <a:p>
             <a:fld id="{EF0E5ADF-327A-46A2-8071-02D8FFF28639}" type="datetimeFigureOut">
               <a:rPr lang="en-US" smtClean="0"/>
-              <a:t>5/17/2017</a:t>
+              <a:t>5/19/2017</a:t>
             </a:fld>
             <a:endParaRPr lang="en-US"/>
           </a:p>
@@ -1995,7 +1996,7 @@
           <a:p>
             <a:fld id="{EF0E5ADF-327A-46A2-8071-02D8FFF28639}" type="datetimeFigureOut">
               <a:rPr lang="en-US" smtClean="0"/>
-              <a:t>5/17/2017</a:t>
+              <a:t>5/19/2017</a:t>
             </a:fld>
             <a:endParaRPr lang="en-US"/>
           </a:p>
@@ -2272,7 +2273,7 @@
           <a:p>
             <a:fld id="{EF0E5ADF-327A-46A2-8071-02D8FFF28639}" type="datetimeFigureOut">
               <a:rPr lang="en-US" smtClean="0"/>
-              <a:t>5/17/2017</a:t>
+              <a:t>5/19/2017</a:t>
             </a:fld>
             <a:endParaRPr lang="en-US"/>
           </a:p>
@@ -2525,7 +2526,7 @@
           <a:p>
             <a:fld id="{EF0E5ADF-327A-46A2-8071-02D8FFF28639}" type="datetimeFigureOut">
               <a:rPr lang="en-US" smtClean="0"/>
-              <a:t>5/17/2017</a:t>
+              <a:t>5/19/2017</a:t>
             </a:fld>
             <a:endParaRPr lang="en-US"/>
           </a:p>
@@ -2738,7 +2739,7 @@
           <a:p>
             <a:fld id="{EF0E5ADF-327A-46A2-8071-02D8FFF28639}" type="datetimeFigureOut">
               <a:rPr lang="en-US" smtClean="0"/>
-              <a:t>5/17/2017</a:t>
+              <a:t>5/19/2017</a:t>
             </a:fld>
             <a:endParaRPr lang="en-US"/>
           </a:p>
@@ -4648,6 +4649,295 @@
 </p:sld>
 </file>
 
+<file path=ppt/slides/slide4.xml><?xml version="1.0" encoding="utf-8"?>
+<p:sld xmlns:a="http://schemas.openxmlformats.org/drawingml/2006/main" xmlns:r="http://schemas.openxmlformats.org/officeDocument/2006/relationships" xmlns:p="http://schemas.openxmlformats.org/presentationml/2006/main">
+  <p:cSld>
+    <p:spTree>
+      <p:nvGrpSpPr>
+        <p:cNvPr id="1" name=""/>
+        <p:cNvGrpSpPr/>
+        <p:nvPr/>
+      </p:nvGrpSpPr>
+      <p:grpSpPr>
+        <a:xfrm>
+          <a:off x="0" y="0"/>
+          <a:ext cx="0" cy="0"/>
+          <a:chOff x="0" y="0"/>
+          <a:chExt cx="0" cy="0"/>
+        </a:xfrm>
+      </p:grpSpPr>
+      <p:sp>
+        <p:nvSpPr>
+          <p:cNvPr id="4" name="Can 3"/>
+          <p:cNvSpPr/>
+          <p:nvPr/>
+        </p:nvSpPr>
+        <p:spPr>
+          <a:xfrm>
+            <a:off x="7086600" y="4803721"/>
+            <a:ext cx="1143000" cy="1219200"/>
+          </a:xfrm>
+          <a:prstGeom prst="can">
+            <a:avLst/>
+          </a:prstGeom>
+        </p:spPr>
+        <p:style>
+          <a:lnRef idx="0">
+            <a:schemeClr val="accent2"/>
+          </a:lnRef>
+          <a:fillRef idx="3">
+            <a:schemeClr val="accent2"/>
+          </a:fillRef>
+          <a:effectRef idx="3">
+            <a:schemeClr val="accent2"/>
+          </a:effectRef>
+          <a:fontRef idx="minor">
+            <a:schemeClr val="lt1"/>
+          </a:fontRef>
+        </p:style>
+        <p:txBody>
+          <a:bodyPr rtlCol="0" anchor="ctr"/>
+          <a:lstStyle/>
+          <a:p>
+            <a:pPr algn="ctr"/>
+            <a:r>
+              <a:rPr lang="en-US" dirty="0" smtClean="0"/>
+              <a:t>Data Source</a:t>
+            </a:r>
+            <a:endParaRPr lang="en-US" dirty="0"/>
+          </a:p>
+        </p:txBody>
+      </p:sp>
+      <p:sp>
+        <p:nvSpPr>
+          <p:cNvPr id="5" name="Cloud 4"/>
+          <p:cNvSpPr/>
+          <p:nvPr/>
+        </p:nvSpPr>
+        <p:spPr>
+          <a:xfrm>
+            <a:off x="3566745" y="2286000"/>
+            <a:ext cx="3276600" cy="2438400"/>
+          </a:xfrm>
+          <a:prstGeom prst="cloud">
+            <a:avLst/>
+          </a:prstGeom>
+        </p:spPr>
+        <p:style>
+          <a:lnRef idx="1">
+            <a:schemeClr val="dk1"/>
+          </a:lnRef>
+          <a:fillRef idx="2">
+            <a:schemeClr val="dk1"/>
+          </a:fillRef>
+          <a:effectRef idx="1">
+            <a:schemeClr val="dk1"/>
+          </a:effectRef>
+          <a:fontRef idx="minor">
+            <a:schemeClr val="dk1"/>
+          </a:fontRef>
+        </p:style>
+        <p:txBody>
+          <a:bodyPr rtlCol="0" anchor="ctr"/>
+          <a:lstStyle/>
+          <a:p>
+            <a:pPr algn="ctr"/>
+            <a:endParaRPr lang="en-US"/>
+          </a:p>
+        </p:txBody>
+      </p:sp>
+      <p:grpSp>
+        <p:nvGrpSpPr>
+          <p:cNvPr id="12" name="Group 11"/>
+          <p:cNvGrpSpPr/>
+          <p:nvPr/>
+        </p:nvGrpSpPr>
+        <p:grpSpPr>
+          <a:xfrm>
+            <a:off x="1524000" y="533400"/>
+            <a:ext cx="1909562" cy="1602528"/>
+            <a:chOff x="1499410" y="304800"/>
+            <a:chExt cx="1909562" cy="1602528"/>
+          </a:xfrm>
+        </p:grpSpPr>
+        <p:sp>
+          <p:nvSpPr>
+            <p:cNvPr id="8" name="5-Point Star 7"/>
+            <p:cNvSpPr/>
+            <p:nvPr/>
+          </p:nvSpPr>
+          <p:spPr>
+            <a:xfrm>
+              <a:off x="1844591" y="304800"/>
+              <a:ext cx="1219200" cy="1219200"/>
+            </a:xfrm>
+            <a:prstGeom prst="star5">
+              <a:avLst/>
+            </a:prstGeom>
+          </p:spPr>
+          <p:style>
+            <a:lnRef idx="0">
+              <a:schemeClr val="accent1"/>
+            </a:lnRef>
+            <a:fillRef idx="3">
+              <a:schemeClr val="accent1"/>
+            </a:fillRef>
+            <a:effectRef idx="3">
+              <a:schemeClr val="accent1"/>
+            </a:effectRef>
+            <a:fontRef idx="minor">
+              <a:schemeClr val="lt1"/>
+            </a:fontRef>
+          </p:style>
+          <p:txBody>
+            <a:bodyPr rtlCol="0" anchor="ctr"/>
+            <a:lstStyle/>
+            <a:p>
+              <a:pPr algn="ctr"/>
+              <a:endParaRPr lang="en-US" dirty="0"/>
+            </a:p>
+          </p:txBody>
+        </p:sp>
+        <p:sp>
+          <p:nvSpPr>
+            <p:cNvPr id="9" name="TextBox 8"/>
+            <p:cNvSpPr txBox="1"/>
+            <p:nvPr/>
+          </p:nvSpPr>
+          <p:spPr>
+            <a:xfrm>
+              <a:off x="1499410" y="1537996"/>
+              <a:ext cx="1909562" cy="369332"/>
+            </a:xfrm>
+            <a:prstGeom prst="rect">
+              <a:avLst/>
+            </a:prstGeom>
+            <a:noFill/>
+          </p:spPr>
+          <p:txBody>
+            <a:bodyPr wrap="none" rtlCol="0">
+              <a:spAutoFit/>
+            </a:bodyPr>
+            <a:lstStyle/>
+            <a:p>
+              <a:r>
+                <a:rPr lang="en-US" dirty="0" smtClean="0"/>
+                <a:t>Business Outcome</a:t>
+              </a:r>
+              <a:endParaRPr lang="en-US" dirty="0"/>
+            </a:p>
+          </p:txBody>
+        </p:sp>
+      </p:grpSp>
+      <p:sp>
+        <p:nvSpPr>
+          <p:cNvPr id="10" name="Down Arrow 9"/>
+          <p:cNvSpPr/>
+          <p:nvPr/>
+        </p:nvSpPr>
+        <p:spPr>
+          <a:xfrm rot="7699756">
+            <a:off x="6482679" y="4243688"/>
+            <a:ext cx="457200" cy="666838"/>
+          </a:xfrm>
+          <a:prstGeom prst="downArrow">
+            <a:avLst/>
+          </a:prstGeom>
+          <a:noFill/>
+          <a:ln w="9525" cap="flat" cmpd="sng" algn="ctr">
+            <a:solidFill>
+              <a:schemeClr val="dk1"/>
+            </a:solidFill>
+            <a:prstDash val="solid"/>
+            <a:round/>
+            <a:headEnd type="none" w="med" len="med"/>
+            <a:tailEnd type="none" w="med" len="med"/>
+          </a:ln>
+        </p:spPr>
+        <p:style>
+          <a:lnRef idx="0">
+            <a:scrgbClr r="0" g="0" b="0"/>
+          </a:lnRef>
+          <a:fillRef idx="0">
+            <a:scrgbClr r="0" g="0" b="0"/>
+          </a:fillRef>
+          <a:effectRef idx="0">
+            <a:scrgbClr r="0" g="0" b="0"/>
+          </a:effectRef>
+          <a:fontRef idx="minor">
+            <a:schemeClr val="dk1"/>
+          </a:fontRef>
+        </p:style>
+        <p:txBody>
+          <a:bodyPr rtlCol="0" anchor="ctr"/>
+          <a:lstStyle/>
+          <a:p>
+            <a:pPr algn="ctr"/>
+            <a:endParaRPr lang="en-US"/>
+          </a:p>
+        </p:txBody>
+      </p:sp>
+      <p:sp>
+        <p:nvSpPr>
+          <p:cNvPr id="11" name="Down Arrow 10"/>
+          <p:cNvSpPr/>
+          <p:nvPr/>
+        </p:nvSpPr>
+        <p:spPr>
+          <a:xfrm rot="7699756">
+            <a:off x="3426009" y="1952581"/>
+            <a:ext cx="457200" cy="666838"/>
+          </a:xfrm>
+          <a:prstGeom prst="downArrow">
+            <a:avLst/>
+          </a:prstGeom>
+          <a:noFill/>
+          <a:ln w="9525" cap="flat" cmpd="sng" algn="ctr">
+            <a:solidFill>
+              <a:schemeClr val="dk1"/>
+            </a:solidFill>
+            <a:prstDash val="solid"/>
+            <a:round/>
+            <a:headEnd type="none" w="med" len="med"/>
+            <a:tailEnd type="none" w="med" len="med"/>
+          </a:ln>
+        </p:spPr>
+        <p:style>
+          <a:lnRef idx="0">
+            <a:scrgbClr r="0" g="0" b="0"/>
+          </a:lnRef>
+          <a:fillRef idx="0">
+            <a:scrgbClr r="0" g="0" b="0"/>
+          </a:fillRef>
+          <a:effectRef idx="0">
+            <a:scrgbClr r="0" g="0" b="0"/>
+          </a:effectRef>
+          <a:fontRef idx="minor">
+            <a:schemeClr val="dk1"/>
+          </a:fontRef>
+        </p:style>
+        <p:txBody>
+          <a:bodyPr rtlCol="0" anchor="ctr"/>
+          <a:lstStyle/>
+          <a:p>
+            <a:pPr algn="ctr"/>
+            <a:endParaRPr lang="en-US"/>
+          </a:p>
+        </p:txBody>
+      </p:sp>
+    </p:spTree>
+    <p:extLst>
+      <p:ext uri="{BB962C8B-B14F-4D97-AF65-F5344CB8AC3E}">
+        <p14:creationId xmlns:p14="http://schemas.microsoft.com/office/powerpoint/2010/main" val="256628217"/>
+      </p:ext>
+    </p:extLst>
+  </p:cSld>
+  <p:clrMapOvr>
+    <a:masterClrMapping/>
+  </p:clrMapOvr>
+</p:sld>
+</file>
+
 <file path=ppt/theme/theme1.xml><?xml version="1.0" encoding="utf-8"?>
 <a:theme xmlns:a="http://schemas.openxmlformats.org/drawingml/2006/main" name="Office Theme">
   <a:themeElements>

</xml_diff>